<commit_message>
inserted img in instructions
</commit_message>
<xml_diff>
--- a/_Instructies/Instructies - Vision.pptx
+++ b/_Instructies/Instructies - Vision.pptx
@@ -3457,7 +3457,7 @@
           <p:nvPr>
             <p:extLst>
               <p:ext uri="{D42A27DB-BD31-4B8C-83A1-F6EECF244321}">
-                <p14:modId xmlns:p14="http://schemas.microsoft.com/office/powerpoint/2010/main" val="74052259"/>
+                <p14:modId xmlns:p14="http://schemas.microsoft.com/office/powerpoint/2010/main" val="3209730296"/>
               </p:ext>
             </p:extLst>
           </p:nvPr>
@@ -4223,7 +4223,16 @@
                         <a:rPr lang="nl-NL" sz="1000" baseline="0" noProof="0" dirty="0">
                           <a:latin typeface="Gill Sans MT" panose="020B0502020104020203" pitchFamily="34" charset="0"/>
                         </a:rPr>
-                        <a:t>Verbind de Camera aan de Laptop via de blauwe USB-kabel </a:t>
+                        <a:t>Verbind de Camera aan de Laptop via de </a:t>
+                      </a:r>
+                      <a:r>
+                        <a:rPr lang="nl-NL" sz="1000" baseline="0" noProof="0" dirty="0">
+                          <a:solidFill>
+                            <a:srgbClr val="239CDB"/>
+                          </a:solidFill>
+                          <a:latin typeface="Gill Sans MT" panose="020B0502020104020203" pitchFamily="34" charset="0"/>
+                        </a:rPr>
+                        <a:t>blauwe USB-kabel </a:t>
                       </a:r>
                       <a:r>
                         <a:rPr lang="nl-NL" sz="1000" baseline="0" noProof="0" dirty="0">
@@ -4244,6 +4253,41 @@
                           <a:latin typeface="Gill Sans MT" panose="020B0502020104020203" pitchFamily="34" charset="0"/>
                         </a:rPr>
                         <a:t>Zet nu de Laptop aan</a:t>
+                      </a:r>
+                    </a:p>
+                    <a:p>
+                      <a:pPr marL="228600" indent="-228600">
+                        <a:buAutoNum type="alphaLcParenR"/>
+                      </a:pPr>
+                      <a:r>
+                        <a:rPr lang="nl-NL" sz="1000" baseline="0" noProof="0" dirty="0">
+                          <a:latin typeface="Gill Sans MT" panose="020B0502020104020203" pitchFamily="34" charset="0"/>
+                        </a:rPr>
+                        <a:t>Haal het </a:t>
+                      </a:r>
+                      <a:r>
+                        <a:rPr lang="nl-NL" sz="1000" baseline="0" noProof="0" dirty="0">
+                          <a:solidFill>
+                            <a:srgbClr val="239CDB"/>
+                          </a:solidFill>
+                          <a:latin typeface="Gill Sans MT" panose="020B0502020104020203" pitchFamily="34" charset="0"/>
+                        </a:rPr>
+                        <a:t>Lens Klepje </a:t>
+                      </a:r>
+                      <a:r>
+                        <a:rPr lang="nl-NL" sz="1000" baseline="0" noProof="0" dirty="0">
+                          <a:latin typeface="Gill Sans MT" panose="020B0502020104020203" pitchFamily="34" charset="0"/>
+                        </a:rPr>
+                        <a:t>er af </a:t>
+                      </a:r>
+                      <a:r>
+                        <a:rPr lang="nl-NL" sz="1000" baseline="0" noProof="0" dirty="0">
+                          <a:solidFill>
+                            <a:srgbClr val="CA4E19"/>
+                          </a:solidFill>
+                          <a:latin typeface="Gill Sans MT" panose="020B0502020104020203" pitchFamily="34" charset="0"/>
+                        </a:rPr>
+                        <a:t>F</a:t>
                       </a:r>
                     </a:p>
                   </a:txBody>
@@ -4487,7 +4531,16 @@
                         <a:rPr lang="nl-NL" sz="1000" baseline="0" noProof="0" dirty="0">
                           <a:latin typeface="Gill Sans MT" panose="020B0502020104020203" pitchFamily="34" charset="0"/>
                         </a:rPr>
-                        <a:t>:</a:t>
+                        <a:t>: </a:t>
+                      </a:r>
+                      <a:r>
+                        <a:rPr lang="nl-NL" sz="1000" baseline="0" noProof="0" dirty="0">
+                          <a:solidFill>
+                            <a:srgbClr val="CA4E19"/>
+                          </a:solidFill>
+                          <a:latin typeface="Gill Sans MT" panose="020B0502020104020203" pitchFamily="34" charset="0"/>
+                        </a:rPr>
+                        <a:t>G</a:t>
                       </a:r>
                     </a:p>
                     <a:p>
@@ -4576,7 +4629,7 @@
                           </a:solidFill>
                           <a:latin typeface="Gill Sans MT" panose="020B0502020104020203" pitchFamily="34" charset="0"/>
                         </a:rPr>
-                        <a:t>F</a:t>
+                        <a:t>H</a:t>
                       </a:r>
                       <a:endParaRPr lang="nl-NL" sz="1000" baseline="0" noProof="0" dirty="0">
                         <a:latin typeface="Gill Sans MT" panose="020B0502020104020203" pitchFamily="34" charset="0"/>
@@ -4622,7 +4675,7 @@
                     </a:solidFill>
                   </a:tcPr>
                 </a:tc>
-                <a:tc>
+                <a:tc gridSpan="2">
                   <a:txBody>
                     <a:bodyPr/>
                     <a:lstStyle/>
@@ -4646,9 +4699,7 @@
                     </a:lnL>
                     <a:lnR w="12700" cap="flat" cmpd="sng" algn="ctr">
                       <a:solidFill>
-                        <a:schemeClr val="bg1">
-                          <a:lumMod val="50000"/>
-                        </a:schemeClr>
+                        <a:srgbClr val="2E377F"/>
                       </a:solidFill>
                       <a:prstDash val="solid"/>
                       <a:round/>
@@ -4682,17 +4733,14 @@
                     </a:solidFill>
                   </a:tcPr>
                 </a:tc>
-                <a:tc>
+                <a:tc hMerge="1">
                   <a:txBody>
                     <a:bodyPr/>
                     <a:lstStyle/>
                     <a:p>
-                      <a:r>
-                        <a:rPr lang="nl-NL" sz="1000" noProof="0" dirty="0">
-                          <a:latin typeface="Gill Sans MT" panose="020B0502020104020203" pitchFamily="34" charset="0"/>
-                        </a:rPr>
-                        <a:t>Foto van wegklikken waarschuwing wifi</a:t>
-                      </a:r>
+                      <a:endParaRPr lang="nl-NL" sz="1000" noProof="0" dirty="0">
+                        <a:latin typeface="Gill Sans MT" panose="020B0502020104020203" pitchFamily="34" charset="0"/>
+                      </a:endParaRPr>
                     </a:p>
                   </a:txBody>
                   <a:tcPr>
@@ -4901,7 +4949,7 @@
                           <a:ea typeface="+mn-ea"/>
                           <a:cs typeface="+mn-cs"/>
                         </a:rPr>
-                        <a:t>G</a:t>
+                        <a:t>I</a:t>
                       </a:r>
                       <a:endParaRPr kumimoji="0" lang="nl-NL" sz="1000" b="0" i="0" u="none" strike="noStrike" kern="1200" cap="none" spc="0" normalizeH="0" baseline="0" noProof="0" dirty="0">
                         <a:ln>
@@ -5066,15 +5114,12 @@
                     <a:bodyPr/>
                     <a:lstStyle/>
                     <a:p>
-                      <a:r>
-                        <a:rPr lang="nl-NL" sz="1000" noProof="0" dirty="0">
-                          <a:solidFill>
-                            <a:schemeClr val="tx1"/>
-                          </a:solidFill>
-                          <a:latin typeface="Gill Sans MT" panose="020B0502020104020203" pitchFamily="34" charset="0"/>
-                        </a:rPr>
-                        <a:t>Taakbalk foto</a:t>
-                      </a:r>
+                      <a:endParaRPr lang="nl-NL" sz="1000" noProof="0" dirty="0">
+                        <a:solidFill>
+                          <a:schemeClr val="tx1"/>
+                        </a:solidFill>
+                        <a:latin typeface="Gill Sans MT" panose="020B0502020104020203" pitchFamily="34" charset="0"/>
+                      </a:endParaRPr>
                     </a:p>
                   </a:txBody>
                   <a:tcPr>
@@ -5186,7 +5231,7 @@
                           </a:solidFill>
                           <a:latin typeface="Gill Sans MT" panose="020B0502020104020203" pitchFamily="34" charset="0"/>
                         </a:rPr>
-                        <a:t>I</a:t>
+                        <a:t>K</a:t>
                       </a:r>
                       <a:r>
                         <a:rPr lang="nl-NL" sz="1000" noProof="0" dirty="0">
@@ -5201,7 +5246,7 @@
                           </a:solidFill>
                           <a:latin typeface="Gill Sans MT" panose="020B0502020104020203" pitchFamily="34" charset="0"/>
                         </a:rPr>
-                        <a:t>J</a:t>
+                        <a:t>L</a:t>
                       </a:r>
                       <a:r>
                         <a:rPr lang="nl-NL" sz="1000" noProof="0" dirty="0">
@@ -5240,7 +5285,7 @@
                           </a:solidFill>
                           <a:latin typeface="Gill Sans MT" panose="020B0502020104020203" pitchFamily="34" charset="0"/>
                         </a:rPr>
-                        <a:t>H</a:t>
+                        <a:t>J</a:t>
                       </a:r>
                     </a:p>
                     <a:p>
@@ -5252,25 +5297,7 @@
                         <a:rPr lang="nl-NL" sz="1000" noProof="0" dirty="0">
                           <a:latin typeface="Gill Sans MT" panose="020B0502020104020203" pitchFamily="34" charset="0"/>
                         </a:rPr>
-                        <a:t>Sluit geen van de vensters en druk </a:t>
-                      </a:r>
-                      <a:r>
-                        <a:rPr lang="nl-NL" sz="1000" noProof="0" dirty="0">
-                          <a:solidFill>
-                            <a:srgbClr val="FF0000"/>
-                          </a:solidFill>
-                          <a:latin typeface="Gill Sans MT" panose="020B0502020104020203" pitchFamily="34" charset="0"/>
-                        </a:rPr>
-                        <a:t>GEEN </a:t>
-                      </a:r>
-                      <a:r>
-                        <a:rPr lang="nl-NL" sz="1000" noProof="0" dirty="0">
-                          <a:solidFill>
-                            <a:srgbClr val="239CDB"/>
-                          </a:solidFill>
-                          <a:latin typeface="Gill Sans MT" panose="020B0502020104020203" pitchFamily="34" charset="0"/>
-                        </a:rPr>
-                        <a:t>Windows + D</a:t>
+                        <a:t>Sluit geen van de vensters</a:t>
                       </a:r>
                     </a:p>
                     <a:p>
@@ -5297,7 +5324,7 @@
                         <a:rPr lang="nl-NL" sz="1000" noProof="0" dirty="0">
                           <a:latin typeface="Gill Sans MT" panose="020B0502020104020203" pitchFamily="34" charset="0"/>
                         </a:rPr>
-                        <a:t>op het bureau blad</a:t>
+                        <a:t>op het bureaublad</a:t>
                       </a:r>
                     </a:p>
                   </a:txBody>
@@ -5519,7 +5546,7 @@
                           </a:solidFill>
                           <a:latin typeface="Gill Sans MT" panose="020B0502020104020203" pitchFamily="34" charset="0"/>
                         </a:rPr>
-                        <a:t>I</a:t>
+                        <a:t>K</a:t>
                       </a:r>
                     </a:p>
                     <a:p>
@@ -5599,7 +5626,7 @@
                           </a:solidFill>
                           <a:latin typeface="Gill Sans MT" panose="020B0502020104020203" pitchFamily="34" charset="0"/>
                         </a:rPr>
-                        <a:t>J</a:t>
+                        <a:t>L</a:t>
                       </a:r>
                     </a:p>
                     <a:p>
@@ -5774,109 +5801,6 @@
                         <a:uLnTx/>
                         <a:uFillTx/>
                         <a:latin typeface="Gill Sans MT" panose="020B0502020104020203" pitchFamily="34" charset="0"/>
-                        <a:ea typeface="+mn-ea"/>
-                        <a:cs typeface="+mn-cs"/>
-                      </a:endParaRPr>
-                    </a:p>
-                    <a:p>
-                      <a:pPr marL="0" marR="0" lvl="0" indent="0" algn="l" defTabSz="914400" rtl="0" eaLnBrk="1" fontAlgn="auto" latinLnBrk="0" hangingPunct="1">
-                        <a:lnSpc>
-                          <a:spcPct val="100000"/>
-                        </a:lnSpc>
-                        <a:spcBef>
-                          <a:spcPts val="0"/>
-                        </a:spcBef>
-                        <a:spcAft>
-                          <a:spcPts val="0"/>
-                        </a:spcAft>
-                        <a:buClrTx/>
-                        <a:buSzTx/>
-                        <a:buFontTx/>
-                        <a:buNone/>
-                        <a:tabLst/>
-                        <a:defRPr/>
-                      </a:pPr>
-                      <a:r>
-                        <a:rPr kumimoji="0" lang="nl-NL" sz="1000" b="0" i="0" u="none" strike="noStrike" kern="1200" cap="none" spc="0" normalizeH="0" baseline="0" noProof="0" dirty="0">
-                          <a:ln>
-                            <a:noFill/>
-                          </a:ln>
-                          <a:solidFill>
-                            <a:prstClr val="black"/>
-                          </a:solidFill>
-                          <a:effectLst/>
-                          <a:uLnTx/>
-                          <a:uFillTx/>
-                          <a:latin typeface="Gill Sans MT" panose="020B0502020104020203" pitchFamily="34" charset="0"/>
-                          <a:ea typeface="+mn-ea"/>
-                          <a:cs typeface="+mn-cs"/>
-                        </a:rPr>
-                        <a:t>Scherm Kalibratie met uitleg van elk scherm</a:t>
-                      </a:r>
-                    </a:p>
-                    <a:p>
-                      <a:pPr marL="0" marR="0" lvl="0" indent="0" algn="l" defTabSz="914400" rtl="0" eaLnBrk="1" fontAlgn="auto" latinLnBrk="0" hangingPunct="1">
-                        <a:lnSpc>
-                          <a:spcPct val="100000"/>
-                        </a:lnSpc>
-                        <a:spcBef>
-                          <a:spcPts val="0"/>
-                        </a:spcBef>
-                        <a:spcAft>
-                          <a:spcPts val="0"/>
-                        </a:spcAft>
-                        <a:buClrTx/>
-                        <a:buSzTx/>
-                        <a:buFontTx/>
-                        <a:buNone/>
-                        <a:tabLst/>
-                        <a:defRPr/>
-                      </a:pPr>
-                      <a:r>
-                        <a:rPr kumimoji="0" lang="nl-NL" sz="1000" b="0" i="0" u="none" strike="noStrike" kern="1200" cap="none" spc="0" normalizeH="0" baseline="0" noProof="0" dirty="0">
-                          <a:ln>
-                            <a:noFill/>
-                          </a:ln>
-                          <a:solidFill>
-                            <a:prstClr val="black"/>
-                          </a:solidFill>
-                          <a:effectLst/>
-                          <a:uLnTx/>
-                          <a:uFillTx/>
-                          <a:latin typeface="Gill Sans MT" panose="020B0502020104020203" pitchFamily="34" charset="0"/>
-                          <a:ea typeface="+mn-ea"/>
-                          <a:cs typeface="+mn-cs"/>
-                        </a:rPr>
-                        <a:t>Scherm gebruik met uitleg elk </a:t>
-                      </a:r>
-                      <a:r>
-                        <a:rPr kumimoji="0" lang="nl-NL" sz="1000" b="0" i="0" u="none" strike="noStrike" kern="1200" cap="none" spc="0" normalizeH="0" baseline="0" noProof="0" dirty="0" err="1">
-                          <a:ln>
-                            <a:noFill/>
-                          </a:ln>
-                          <a:solidFill>
-                            <a:prstClr val="black"/>
-                          </a:solidFill>
-                          <a:effectLst/>
-                          <a:uLnTx/>
-                          <a:uFillTx/>
-                          <a:latin typeface="Gill Sans MT" panose="020B0502020104020203" pitchFamily="34" charset="0"/>
-                          <a:ea typeface="+mn-ea"/>
-                          <a:cs typeface="+mn-cs"/>
-                        </a:rPr>
-                        <a:t>window</a:t>
-                      </a:r>
-                      <a:endParaRPr kumimoji="0" lang="nl-NL" sz="1800" b="0" i="0" u="none" strike="noStrike" kern="1200" cap="none" spc="0" normalizeH="0" baseline="0" noProof="0" dirty="0">
-                        <a:ln>
-                          <a:noFill/>
-                        </a:ln>
-                        <a:solidFill>
-                          <a:prstClr val="black"/>
-                        </a:solidFill>
-                        <a:effectLst/>
-                        <a:uLnTx/>
-                        <a:uFillTx/>
-                        <a:latin typeface="+mn-lt"/>
                         <a:ea typeface="+mn-ea"/>
                         <a:cs typeface="+mn-cs"/>
                       </a:endParaRPr>
@@ -6320,6 +6244,286 @@
           </a:p>
         </p:txBody>
       </p:sp>
+      <p:pic>
+        <p:nvPicPr>
+          <p:cNvPr id="3" name="Picture 2" descr="Graphical user interface&#10;&#10;Description automatically generated">
+            <a:extLst>
+              <a:ext uri="{FF2B5EF4-FFF2-40B4-BE49-F238E27FC236}">
+                <a16:creationId xmlns:a16="http://schemas.microsoft.com/office/drawing/2014/main" id="{5C5A1C84-7E00-4FC2-839A-8F3059065242}"/>
+              </a:ext>
+            </a:extLst>
+          </p:cNvPr>
+          <p:cNvPicPr>
+            <a:picLocks noChangeAspect="1"/>
+          </p:cNvPicPr>
+          <p:nvPr/>
+        </p:nvPicPr>
+        <p:blipFill rotWithShape="1">
+          <a:blip r:embed="rId2" cstate="print">
+            <a:extLst>
+              <a:ext uri="{28A0092B-C50C-407E-A947-70E740481C1C}">
+                <a14:useLocalDpi xmlns:a14="http://schemas.microsoft.com/office/drawing/2010/main" val="0"/>
+              </a:ext>
+            </a:extLst>
+          </a:blip>
+          <a:srcRect t="3627" b="56477"/>
+          <a:stretch/>
+        </p:blipFill>
+        <p:spPr>
+          <a:xfrm>
+            <a:off x="3561003" y="4304928"/>
+            <a:ext cx="1312800" cy="916742"/>
+          </a:xfrm>
+          <a:prstGeom prst="rect">
+            <a:avLst/>
+          </a:prstGeom>
+        </p:spPr>
+      </p:pic>
+      <p:sp>
+        <p:nvSpPr>
+          <p:cNvPr id="16" name="Tekstvak 17">
+            <a:extLst>
+              <a:ext uri="{FF2B5EF4-FFF2-40B4-BE49-F238E27FC236}">
+                <a16:creationId xmlns:a16="http://schemas.microsoft.com/office/drawing/2014/main" id="{8E0E21AE-7503-4AFD-8010-233B124A038E}"/>
+              </a:ext>
+            </a:extLst>
+          </p:cNvPr>
+          <p:cNvSpPr txBox="1"/>
+          <p:nvPr/>
+        </p:nvSpPr>
+        <p:spPr>
+          <a:xfrm>
+            <a:off x="4629055" y="4304928"/>
+            <a:ext cx="243978" cy="246221"/>
+          </a:xfrm>
+          <a:prstGeom prst="rect">
+            <a:avLst/>
+          </a:prstGeom>
+          <a:solidFill>
+            <a:schemeClr val="bg1"/>
+          </a:solidFill>
+          <a:ln>
+            <a:solidFill>
+              <a:srgbClr val="CA4E19"/>
+            </a:solidFill>
+          </a:ln>
+        </p:spPr>
+        <p:txBody>
+          <a:bodyPr wrap="none" rtlCol="0">
+            <a:spAutoFit/>
+          </a:bodyPr>
+          <a:lstStyle/>
+          <a:p>
+            <a:r>
+              <a:rPr lang="nl-NL" sz="1000" dirty="0">
+                <a:solidFill>
+                  <a:srgbClr val="CA4E19"/>
+                </a:solidFill>
+              </a:rPr>
+              <a:t>F</a:t>
+            </a:r>
+          </a:p>
+        </p:txBody>
+      </p:sp>
+      <p:pic>
+        <p:nvPicPr>
+          <p:cNvPr id="14" name="Picture 13" descr="Graphical user interface&#10;&#10;Description automatically generated">
+            <a:extLst>
+              <a:ext uri="{FF2B5EF4-FFF2-40B4-BE49-F238E27FC236}">
+                <a16:creationId xmlns:a16="http://schemas.microsoft.com/office/drawing/2014/main" id="{80EE2823-41DB-42A0-90E2-82EF98E56A9A}"/>
+              </a:ext>
+            </a:extLst>
+          </p:cNvPr>
+          <p:cNvPicPr>
+            <a:picLocks noChangeAspect="1"/>
+          </p:cNvPicPr>
+          <p:nvPr/>
+        </p:nvPicPr>
+        <p:blipFill rotWithShape="1">
+          <a:blip r:embed="rId3" cstate="print">
+            <a:extLst>
+              <a:ext uri="{28A0092B-C50C-407E-A947-70E740481C1C}">
+                <a14:useLocalDpi xmlns:a14="http://schemas.microsoft.com/office/drawing/2010/main" val="0"/>
+              </a:ext>
+            </a:extLst>
+          </a:blip>
+          <a:srcRect l="36350" t="8934" r="35300" b="44400"/>
+          <a:stretch/>
+        </p:blipFill>
+        <p:spPr>
+          <a:xfrm>
+            <a:off x="5104777" y="4315500"/>
+            <a:ext cx="983059" cy="910238"/>
+          </a:xfrm>
+          <a:prstGeom prst="rect">
+            <a:avLst/>
+          </a:prstGeom>
+        </p:spPr>
+      </p:pic>
+      <p:sp>
+        <p:nvSpPr>
+          <p:cNvPr id="19" name="Tekstvak 17">
+            <a:extLst>
+              <a:ext uri="{FF2B5EF4-FFF2-40B4-BE49-F238E27FC236}">
+                <a16:creationId xmlns:a16="http://schemas.microsoft.com/office/drawing/2014/main" id="{C96C61F4-33CF-4348-82B7-593FC426694E}"/>
+              </a:ext>
+            </a:extLst>
+          </p:cNvPr>
+          <p:cNvSpPr txBox="1"/>
+          <p:nvPr/>
+        </p:nvSpPr>
+        <p:spPr>
+          <a:xfrm>
+            <a:off x="5823020" y="4315500"/>
+            <a:ext cx="264816" cy="246221"/>
+          </a:xfrm>
+          <a:prstGeom prst="rect">
+            <a:avLst/>
+          </a:prstGeom>
+          <a:solidFill>
+            <a:schemeClr val="bg1"/>
+          </a:solidFill>
+          <a:ln>
+            <a:solidFill>
+              <a:srgbClr val="CA4E19"/>
+            </a:solidFill>
+          </a:ln>
+        </p:spPr>
+        <p:txBody>
+          <a:bodyPr wrap="none" rtlCol="0">
+            <a:spAutoFit/>
+          </a:bodyPr>
+          <a:lstStyle/>
+          <a:p>
+            <a:r>
+              <a:rPr lang="nl-NL" sz="1000" dirty="0">
+                <a:solidFill>
+                  <a:srgbClr val="CA4E19"/>
+                </a:solidFill>
+              </a:rPr>
+              <a:t>G</a:t>
+            </a:r>
+          </a:p>
+        </p:txBody>
+      </p:sp>
+      <p:pic>
+        <p:nvPicPr>
+          <p:cNvPr id="20" name="Picture 19" descr="Graphical user interface&#10;&#10;Description automatically generated">
+            <a:extLst>
+              <a:ext uri="{FF2B5EF4-FFF2-40B4-BE49-F238E27FC236}">
+                <a16:creationId xmlns:a16="http://schemas.microsoft.com/office/drawing/2014/main" id="{1C00ABEB-DF64-46DE-BF29-61BC03F0B39C}"/>
+              </a:ext>
+            </a:extLst>
+          </p:cNvPr>
+          <p:cNvPicPr>
+            <a:picLocks noChangeAspect="1"/>
+          </p:cNvPicPr>
+          <p:nvPr/>
+        </p:nvPicPr>
+        <p:blipFill>
+          <a:blip r:embed="rId4">
+            <a:extLst>
+              <a:ext uri="{28A0092B-C50C-407E-A947-70E740481C1C}">
+                <a14:useLocalDpi xmlns:a14="http://schemas.microsoft.com/office/drawing/2010/main" val="0"/>
+              </a:ext>
+            </a:extLst>
+          </a:blip>
+          <a:stretch>
+            <a:fillRect/>
+          </a:stretch>
+        </p:blipFill>
+        <p:spPr>
+          <a:xfrm>
+            <a:off x="4538321" y="5375728"/>
+            <a:ext cx="1885964" cy="452441"/>
+          </a:xfrm>
+          <a:prstGeom prst="rect">
+            <a:avLst/>
+          </a:prstGeom>
+        </p:spPr>
+      </p:pic>
+      <p:sp>
+        <p:nvSpPr>
+          <p:cNvPr id="22" name="Tekstvak 17">
+            <a:extLst>
+              <a:ext uri="{FF2B5EF4-FFF2-40B4-BE49-F238E27FC236}">
+                <a16:creationId xmlns:a16="http://schemas.microsoft.com/office/drawing/2014/main" id="{39292E2A-475E-49AE-A78E-2D5AD8693BDE}"/>
+              </a:ext>
+            </a:extLst>
+          </p:cNvPr>
+          <p:cNvSpPr txBox="1"/>
+          <p:nvPr/>
+        </p:nvSpPr>
+        <p:spPr>
+          <a:xfrm>
+            <a:off x="6375144" y="5375728"/>
+            <a:ext cx="216726" cy="246221"/>
+          </a:xfrm>
+          <a:prstGeom prst="rect">
+            <a:avLst/>
+          </a:prstGeom>
+          <a:solidFill>
+            <a:schemeClr val="bg1"/>
+          </a:solidFill>
+          <a:ln>
+            <a:solidFill>
+              <a:srgbClr val="CA4E19"/>
+            </a:solidFill>
+          </a:ln>
+        </p:spPr>
+        <p:txBody>
+          <a:bodyPr wrap="none" rtlCol="0">
+            <a:spAutoFit/>
+          </a:bodyPr>
+          <a:lstStyle/>
+          <a:p>
+            <a:r>
+              <a:rPr lang="nl-NL" sz="1000" dirty="0">
+                <a:solidFill>
+                  <a:srgbClr val="CA4E19"/>
+                </a:solidFill>
+              </a:rPr>
+              <a:t>I</a:t>
+            </a:r>
+          </a:p>
+        </p:txBody>
+      </p:sp>
+      <p:pic>
+        <p:nvPicPr>
+          <p:cNvPr id="23" name="Picture 22" descr="A picture containing text&#10;&#10;Description automatically generated">
+            <a:extLst>
+              <a:ext uri="{FF2B5EF4-FFF2-40B4-BE49-F238E27FC236}">
+                <a16:creationId xmlns:a16="http://schemas.microsoft.com/office/drawing/2014/main" id="{93399FBD-0546-4885-BD00-22FE7ADDE0C2}"/>
+              </a:ext>
+            </a:extLst>
+          </p:cNvPr>
+          <p:cNvPicPr>
+            <a:picLocks noChangeAspect="1"/>
+          </p:cNvPicPr>
+          <p:nvPr/>
+        </p:nvPicPr>
+        <p:blipFill>
+          <a:blip r:embed="rId5" cstate="print">
+            <a:extLst>
+              <a:ext uri="{28A0092B-C50C-407E-A947-70E740481C1C}">
+                <a14:useLocalDpi xmlns:a14="http://schemas.microsoft.com/office/drawing/2010/main" val="0"/>
+              </a:ext>
+            </a:extLst>
+          </a:blip>
+          <a:stretch>
+            <a:fillRect/>
+          </a:stretch>
+        </p:blipFill>
+        <p:spPr>
+          <a:xfrm>
+            <a:off x="3322384" y="7079527"/>
+            <a:ext cx="1782393" cy="1002596"/>
+          </a:xfrm>
+          <a:prstGeom prst="rect">
+            <a:avLst/>
+          </a:prstGeom>
+        </p:spPr>
+      </p:pic>
     </p:spTree>
     <p:extLst>
       <p:ext uri="{BB962C8B-B14F-4D97-AF65-F5344CB8AC3E}">
@@ -9968,6 +10172,21 @@
 </file>
 
 <file path=customXml/item1.xml><?xml version="1.0" encoding="utf-8"?>
+<p:properties xmlns:p="http://schemas.microsoft.com/office/2006/metadata/properties" xmlns:xsi="http://www.w3.org/2001/XMLSchema-instance" xmlns:pc="http://schemas.microsoft.com/office/infopath/2007/PartnerControls">
+  <documentManagement/>
+</p:properties>
+</file>
+
+<file path=customXml/item2.xml><?xml version="1.0" encoding="utf-8"?>
+<?mso-contentType ?>
+<FormTemplates xmlns="http://schemas.microsoft.com/sharepoint/v3/contenttype/forms">
+  <Display>DocumentLibraryForm</Display>
+  <Edit>DocumentLibraryForm</Edit>
+  <New>DocumentLibraryForm</New>
+</FormTemplates>
+</file>
+
+<file path=customXml/item3.xml><?xml version="1.0" encoding="utf-8"?>
 <ct:contentTypeSchema xmlns:ct="http://schemas.microsoft.com/office/2006/metadata/contentType" xmlns:ma="http://schemas.microsoft.com/office/2006/metadata/properties/metaAttributes" ct:_="" ma:_="" ma:contentTypeName="Document" ma:contentTypeID="0x0101008A598637B746294AAEA5F85D241B0EE1" ma:contentTypeVersion="12" ma:contentTypeDescription="Create a new document." ma:contentTypeScope="" ma:versionID="c9bdb55fa52ef058bff98111e0d0629e">
   <xsd:schema xmlns:xsd="http://www.w3.org/2001/XMLSchema" xmlns:xs="http://www.w3.org/2001/XMLSchema" xmlns:p="http://schemas.microsoft.com/office/2006/metadata/properties" xmlns:ns2="d3d75ab5-8b6d-4515-b3ee-0b5232f9d842" xmlns:ns3="00a1faba-5a68-46e4-ab10-2e58cbd38f4b" targetNamespace="http://schemas.microsoft.com/office/2006/metadata/properties" ma:root="true" ma:fieldsID="c1716097012a938ec69aaf4d73302034" ns2:_="" ns3:_="">
     <xsd:import namespace="d3d75ab5-8b6d-4515-b3ee-0b5232f9d842"/>
@@ -10184,22 +10403,24 @@
 </ct:contentTypeSchema>
 </file>
 
-<file path=customXml/item2.xml><?xml version="1.0" encoding="utf-8"?>
-<?mso-contentType ?>
-<FormTemplates xmlns="http://schemas.microsoft.com/sharepoint/v3/contenttype/forms">
-  <Display>DocumentLibraryForm</Display>
-  <Edit>DocumentLibraryForm</Edit>
-  <New>DocumentLibraryForm</New>
-</FormTemplates>
+<file path=customXml/itemProps1.xml><?xml version="1.0" encoding="utf-8"?>
+<ds:datastoreItem xmlns:ds="http://schemas.openxmlformats.org/officeDocument/2006/customXml" ds:itemID="{FABD62CA-62DF-4747-883C-A1DCE7F7DAFD}">
+  <ds:schemaRefs>
+    <ds:schemaRef ds:uri="http://schemas.microsoft.com/office/2006/metadata/properties"/>
+    <ds:schemaRef ds:uri="http://schemas.microsoft.com/office/infopath/2007/PartnerControls"/>
+  </ds:schemaRefs>
+</ds:datastoreItem>
 </file>
 
-<file path=customXml/item3.xml><?xml version="1.0" encoding="utf-8"?>
-<p:properties xmlns:p="http://schemas.microsoft.com/office/2006/metadata/properties" xmlns:xsi="http://www.w3.org/2001/XMLSchema-instance" xmlns:pc="http://schemas.microsoft.com/office/infopath/2007/PartnerControls">
-  <documentManagement/>
-</p:properties>
+<file path=customXml/itemProps2.xml><?xml version="1.0" encoding="utf-8"?>
+<ds:datastoreItem xmlns:ds="http://schemas.openxmlformats.org/officeDocument/2006/customXml" ds:itemID="{F9BB3ABB-BDD4-44C1-8761-E7C3014B1A7F}">
+  <ds:schemaRefs>
+    <ds:schemaRef ds:uri="http://schemas.microsoft.com/sharepoint/v3/contenttype/forms"/>
+  </ds:schemaRefs>
+</ds:datastoreItem>
 </file>
 
-<file path=customXml/itemProps1.xml><?xml version="1.0" encoding="utf-8"?>
+<file path=customXml/itemProps3.xml><?xml version="1.0" encoding="utf-8"?>
 <ds:datastoreItem xmlns:ds="http://schemas.openxmlformats.org/officeDocument/2006/customXml" ds:itemID="{32FD72F4-18A7-4A6D-9C95-831E3AC4B213}">
   <ds:schemaRefs>
     <ds:schemaRef ds:uri="http://schemas.microsoft.com/office/2006/metadata/contentType"/>
@@ -10216,21 +10437,4 @@
     <ds:schemaRef ds:uri="http://schemas.microsoft.com/internal/obd"/>
   </ds:schemaRefs>
 </ds:datastoreItem>
-</file>
-
-<file path=customXml/itemProps2.xml><?xml version="1.0" encoding="utf-8"?>
-<ds:datastoreItem xmlns:ds="http://schemas.openxmlformats.org/officeDocument/2006/customXml" ds:itemID="{F9BB3ABB-BDD4-44C1-8761-E7C3014B1A7F}">
-  <ds:schemaRefs>
-    <ds:schemaRef ds:uri="http://schemas.microsoft.com/sharepoint/v3/contenttype/forms"/>
-  </ds:schemaRefs>
-</ds:datastoreItem>
-</file>
-
-<file path=customXml/itemProps3.xml><?xml version="1.0" encoding="utf-8"?>
-<ds:datastoreItem xmlns:ds="http://schemas.openxmlformats.org/officeDocument/2006/customXml" ds:itemID="{FABD62CA-62DF-4747-883C-A1DCE7F7DAFD}">
-  <ds:schemaRefs>
-    <ds:schemaRef ds:uri="http://schemas.microsoft.com/office/2006/metadata/properties"/>
-    <ds:schemaRef ds:uri="http://schemas.microsoft.com/office/infopath/2007/PartnerControls"/>
-  </ds:schemaRefs>
-</ds:datastoreItem>
 </file>
</xml_diff>